<commit_message>
PAI 01 Leerzeichen zu viel
</commit_message>
<xml_diff>
--- a/training-cards/music moves/Pairing (PAI)/ger/apprentice/ger_PAI_01_Aufmerksamkeit_schenken_MM_A-2.pptx
+++ b/training-cards/music moves/Pairing (PAI)/ger/apprentice/ger_PAI_01_Aufmerksamkeit_schenken_MM_A-2.pptx
@@ -458,7 +458,7 @@
                 <a:latin typeface="Avenir Heavy"/>
                 <a:cs typeface="Avenir Heavy"/>
               </a:rPr>
-              <a:t>TR	AININGS</a:t>
+              <a:t>TRAININGS</a:t>
             </a:r>
             <a:r>
               <a:rPr lang="de-DE" sz="2400" dirty="0">
@@ -887,7 +887,7 @@
           <a:p>
             <a:fld id="{FF5B2BAF-DF38-0A48-A798-0C06E514FD52}" type="datetimeFigureOut">
               <a:rPr lang="de-DE" smtClean="0"/>
-              <a:t>18.07.24</a:t>
+              <a:t>27.02.25</a:t>
             </a:fld>
             <a:endParaRPr lang="de-DE" dirty="0"/>
           </a:p>
@@ -1107,7 +1107,7 @@
           <a:p>
             <a:fld id="{FF5B2BAF-DF38-0A48-A798-0C06E514FD52}" type="datetimeFigureOut">
               <a:rPr lang="de-DE" smtClean="0"/>
-              <a:t>18.07.24</a:t>
+              <a:t>27.02.25</a:t>
             </a:fld>
             <a:endParaRPr lang="de-DE" dirty="0"/>
           </a:p>
@@ -1787,6 +1787,7 @@
           </a:bodyPr>
           <a:lstStyle/>
           <a:p>
+            <a:pPr algn="just"/>
             <a:r>
               <a:rPr lang="de-DE" sz="1100" dirty="0"/>
               <a:t>"Pair </a:t>
@@ -1809,6 +1810,7 @@
             </a:r>
           </a:p>
           <a:p>
+            <a:pPr algn="just"/>
             <a:r>
               <a:rPr lang="de-DE" sz="1100" dirty="0"/>
               <a:t>Die Zeit, die man zu zweit verbringt, ist sehr wertvoll. Es empfiehlt sich vorher ein Ende der Übe-Einheit zu definieren und einen </a:t>
@@ -1823,24 +1825,28 @@
             </a:r>
           </a:p>
           <a:p>
+            <a:pPr algn="just"/>
             <a:r>
               <a:rPr lang="de-DE" sz="1100" dirty="0"/>
               <a:t>Es gibt verteilte Rollen, die gleichberechtigt sind: Die Fahrerin oder der „Fahrer“ (ebd., S. 112) führt das Üben aktiv aus und die Partnerin oder der „Partner“ (ebd., S. 112) sitzt dabei und hört zu. Sie oder er unterstützt den Prozess mit seiner Aufmerksamkeit. </a:t>
             </a:r>
           </a:p>
           <a:p>
+            <a:pPr algn="just"/>
             <a:r>
               <a:rPr lang="de-DE" sz="1100" dirty="0"/>
               <a:t>Aufgabe der Fahrerin oder des Fahrers ist einfach nur drauf los zu üben, wie sonst auch.</a:t>
             </a:r>
           </a:p>
           <a:p>
+            <a:pPr algn="just"/>
             <a:r>
               <a:rPr lang="de-DE" sz="1100" dirty="0"/>
               <a:t>Die Partnerin oder der Partner wohnt dem Üben schweigend bei, beobachtet möglichst wertfrei und schreibt mit, was er erlebt. </a:t>
             </a:r>
           </a:p>
           <a:p>
+            <a:pPr algn="just"/>
             <a:r>
               <a:rPr lang="de-DE" sz="1100" dirty="0"/>
               <a:t>Durch die Aufmerksamkeit, die die/der Partner/in der Fahrerin/dem Fahrer beim Üben schenkt, entsteht eine gute Grundspannung, die positive Auswirkungen auf die Qualität, die Effizienz, den Spaß beim Üben und die Verbreitung von Erfahrung und Wissen haben kann.</a:t>

</xml_diff>